<commit_message>
Changes for the presentation
</commit_message>
<xml_diff>
--- a/RomanNumbers/Coding Kata - Romeinse notatie.pptx
+++ b/RomanNumbers/Coding Kata - Romeinse notatie.pptx
@@ -5488,7 +5488,16 @@
                 </a:solidFill>
                 <a:latin typeface="Bebas Neue" panose="020B0000000000000000" pitchFamily="34" charset="0"/>
               </a:rPr>
-              <a:t>: TTD </a:t>
+              <a:t>: </a:t>
+            </a:r>
+            <a:r>
+              <a:rPr lang="nl-NL" sz="3600" dirty="0" smtClean="0">
+                <a:solidFill>
+                  <a:srgbClr val="00572D"/>
+                </a:solidFill>
+                <a:latin typeface="Bebas Neue" panose="020B0000000000000000" pitchFamily="34" charset="0"/>
+              </a:rPr>
+              <a:t>TDD </a:t>
             </a:r>
             <a:r>
               <a:rPr lang="nl-NL" sz="3600" dirty="0" err="1" smtClean="0">
@@ -6136,7 +6145,7 @@
               <a:rPr lang="nl-NL" sz="2800" dirty="0" smtClean="0">
                 <a:latin typeface="Bebas Neue" panose="020B0000000000000000" pitchFamily="34" charset="0"/>
               </a:rPr>
-              <a:t>TTD </a:t>
+              <a:t>TDD </a:t>
             </a:r>
             <a:r>
               <a:rPr lang="nl-NL" sz="2800" dirty="0" err="1" smtClean="0">
@@ -6279,11 +6288,7 @@
             </a:pPr>
             <a:r>
               <a:rPr lang="nl-NL" sz="2800" dirty="0" smtClean="0"/>
-              <a:t>Info en </a:t>
-            </a:r>
-            <a:r>
-              <a:rPr lang="nl-NL" sz="2800" dirty="0" smtClean="0"/>
-              <a:t>user story </a:t>
+              <a:t>Info en user story </a:t>
             </a:r>
             <a:r>
               <a:rPr lang="nl-NL" sz="2800" dirty="0">
@@ -6294,6 +6299,84 @@
                 </a:solidFill>
               </a:rPr>
               <a:t>(20 minuten)</a:t>
+            </a:r>
+          </a:p>
+          <a:p>
+            <a:pPr>
+              <a:lnSpc>
+                <a:spcPct val="100000"/>
+              </a:lnSpc>
+            </a:pPr>
+            <a:endParaRPr lang="nl-NL" sz="2800" dirty="0"/>
+          </a:p>
+          <a:p>
+            <a:pPr>
+              <a:lnSpc>
+                <a:spcPct val="100000"/>
+              </a:lnSpc>
+            </a:pPr>
+            <a:r>
+              <a:rPr lang="nl-NL" sz="2800" dirty="0" smtClean="0"/>
+              <a:t>Coderen </a:t>
+            </a:r>
+            <a:r>
+              <a:rPr lang="nl-NL" sz="2800" dirty="0">
+                <a:solidFill>
+                  <a:schemeClr val="bg1">
+                    <a:lumMod val="65000"/>
+                  </a:schemeClr>
+                </a:solidFill>
+              </a:rPr>
+              <a:t>(60 minuten</a:t>
+            </a:r>
+            <a:r>
+              <a:rPr lang="nl-NL" sz="2800" dirty="0" smtClean="0">
+                <a:solidFill>
+                  <a:schemeClr val="bg1">
+                    <a:lumMod val="65000"/>
+                  </a:schemeClr>
+                </a:solidFill>
+              </a:rPr>
+              <a:t>)</a:t>
+            </a:r>
+            <a:br>
+              <a:rPr lang="nl-NL" sz="2800" dirty="0" smtClean="0">
+                <a:solidFill>
+                  <a:schemeClr val="bg1">
+                    <a:lumMod val="65000"/>
+                  </a:schemeClr>
+                </a:solidFill>
+              </a:rPr>
+            </a:br>
+            <a:r>
+              <a:rPr lang="nl-NL" sz="2800" dirty="0" smtClean="0">
+                <a:solidFill>
+                  <a:schemeClr val="bg1">
+                    <a:lumMod val="65000"/>
+                  </a:schemeClr>
+                </a:solidFill>
+              </a:rPr>
+              <a:t>2x30 + 1x10 </a:t>
+            </a:r>
+            <a:r>
+              <a:rPr lang="nl-NL" sz="2800" dirty="0" err="1" smtClean="0">
+                <a:solidFill>
+                  <a:schemeClr val="bg1">
+                    <a:lumMod val="65000"/>
+                  </a:schemeClr>
+                </a:solidFill>
+              </a:rPr>
+              <a:t>eval</a:t>
+            </a:r>
+            <a:r>
+              <a:rPr lang="nl-NL" sz="2800" dirty="0" smtClean="0">
+                <a:solidFill>
+                  <a:schemeClr val="bg1">
+                    <a:lumMod val="65000"/>
+                  </a:schemeClr>
+                </a:solidFill>
+              </a:rPr>
+              <a:t> – wissel team</a:t>
             </a:r>
             <a:endParaRPr lang="nl-NL" sz="2800" dirty="0">
               <a:solidFill>
@@ -6319,43 +6402,17 @@
             </a:pPr>
             <a:r>
               <a:rPr lang="nl-NL" sz="2800" dirty="0" smtClean="0"/>
-              <a:t>Coderen </a:t>
-            </a:r>
-            <a:r>
-              <a:rPr lang="nl-NL" sz="2800" dirty="0">
+              <a:t>Presentatie en feedback </a:t>
+            </a:r>
+            <a:r>
+              <a:rPr lang="nl-NL" sz="2800" dirty="0" smtClean="0">
                 <a:solidFill>
                   <a:schemeClr val="bg1">
                     <a:lumMod val="65000"/>
                   </a:schemeClr>
                 </a:solidFill>
               </a:rPr>
-              <a:t>(60 minuten)</a:t>
-            </a:r>
-            <a:endParaRPr lang="nl-NL" sz="2800" dirty="0">
-              <a:solidFill>
-                <a:schemeClr val="bg1">
-                  <a:lumMod val="65000"/>
-                </a:schemeClr>
-              </a:solidFill>
-            </a:endParaRPr>
-          </a:p>
-          <a:p>
-            <a:pPr>
-              <a:lnSpc>
-                <a:spcPct val="100000"/>
-              </a:lnSpc>
-            </a:pPr>
-            <a:endParaRPr lang="nl-NL" sz="2800" dirty="0"/>
-          </a:p>
-          <a:p>
-            <a:pPr>
-              <a:lnSpc>
-                <a:spcPct val="100000"/>
-              </a:lnSpc>
-            </a:pPr>
-            <a:r>
-              <a:rPr lang="nl-NL" sz="2800" dirty="0" smtClean="0"/>
-              <a:t>Presentatie en feedback </a:t>
+              <a:t>(30 </a:t>
             </a:r>
             <a:r>
               <a:rPr lang="nl-NL" sz="2800" dirty="0">
@@ -6365,7 +6422,7 @@
                   </a:schemeClr>
                 </a:solidFill>
               </a:rPr>
-              <a:t>(40 minuten)</a:t>
+              <a:t>minuten)</a:t>
             </a:r>
           </a:p>
           <a:p>
@@ -6756,13 +6813,7 @@
               <a:rPr lang="nl-NL" sz="2800" dirty="0" err="1" smtClean="0">
                 <a:latin typeface="Bebas Neue" panose="020B0000000000000000" pitchFamily="34" charset="0"/>
               </a:rPr>
-              <a:t>developm</a:t>
-            </a:r>
-            <a:r>
-              <a:rPr lang="nl-NL" sz="2800" dirty="0" err="1" smtClean="0">
-                <a:latin typeface="Bebas Neue" panose="020B0000000000000000" pitchFamily="34" charset="0"/>
-              </a:rPr>
-              <a:t>ent</a:t>
+              <a:t>development</a:t>
             </a:r>
             <a:endParaRPr lang="nl-NL" dirty="0">
               <a:latin typeface="Bebas Neue" panose="020B0000000000000000" pitchFamily="34" charset="0"/>
@@ -6845,11 +6896,7 @@
             </a:pPr>
             <a:r>
               <a:rPr lang="nl-NL" sz="2800" dirty="0" smtClean="0"/>
-              <a:t>S</a:t>
-            </a:r>
-            <a:r>
-              <a:rPr lang="nl-NL" sz="2800" dirty="0" smtClean="0"/>
-              <a:t>impele regels (maar niet altijd gemakkelijk!)</a:t>
+              <a:t>Simpele regels (maar niet altijd gemakkelijk!)</a:t>
             </a:r>
           </a:p>
           <a:p>
@@ -6881,6 +6928,14 @@
               <a:rPr lang="nl-NL" sz="2000" dirty="0" smtClean="0"/>
               <a:t>!)</a:t>
             </a:r>
+            <a:br>
+              <a:rPr lang="nl-NL" sz="2000" dirty="0" smtClean="0"/>
+            </a:br>
+            <a:r>
+              <a:rPr lang="nl-NL" sz="2000" dirty="0" smtClean="0"/>
+              <a:t>mantra: rood - groen</a:t>
+            </a:r>
+            <a:endParaRPr lang="nl-NL" sz="2000" dirty="0" smtClean="0"/>
           </a:p>
           <a:p>
             <a:pPr marL="457200" indent="-457200">
@@ -6925,8 +6980,21 @@
             </a:r>
             <a:r>
               <a:rPr lang="nl-NL" sz="2000" dirty="0" smtClean="0"/>
-              <a:t>zo simpel mogelijk</a:t>
-            </a:r>
+              <a:t>zo simpel </a:t>
+            </a:r>
+            <a:r>
+              <a:rPr lang="nl-NL" sz="2000" dirty="0" smtClean="0"/>
+              <a:t>mogelijk (KISS</a:t>
+            </a:r>
+            <a:r>
+              <a:rPr lang="nl-NL" sz="2000" dirty="0"/>
+              <a:t>, </a:t>
+            </a:r>
+            <a:r>
+              <a:rPr lang="nl-NL" sz="2000" dirty="0" smtClean="0"/>
+              <a:t>YAGNI)</a:t>
+            </a:r>
+            <a:endParaRPr lang="nl-NL" sz="2000" dirty="0" smtClean="0"/>
           </a:p>
           <a:p>
             <a:pPr marL="457200" indent="-457200">
@@ -6962,7 +7030,11 @@
             </a:r>
             <a:r>
               <a:rPr lang="nl-NL" sz="2000" dirty="0" smtClean="0"/>
-              <a:t> de code </a:t>
+              <a:t> </a:t>
+            </a:r>
+            <a:r>
+              <a:rPr lang="nl-NL" sz="2000" dirty="0" smtClean="0"/>
+              <a:t>de code </a:t>
             </a:r>
             <a:r>
               <a:rPr lang="nl-NL" sz="2000" dirty="0" smtClean="0">
@@ -6972,7 +7044,11 @@
             </a:r>
             <a:r>
               <a:rPr lang="nl-NL" sz="2000" dirty="0" smtClean="0"/>
-              <a:t>clean code, SOLID, KISS, YAGNI</a:t>
+              <a:t>clean code, </a:t>
+            </a:r>
+            <a:r>
+              <a:rPr lang="nl-NL" sz="2000" dirty="0" smtClean="0"/>
+              <a:t>SOLID</a:t>
             </a:r>
           </a:p>
           <a:p>
@@ -6984,8 +7060,16 @@
               <a:buAutoNum type="arabicPeriod"/>
             </a:pPr>
             <a:r>
+              <a:rPr lang="nl-NL" sz="2000" dirty="0"/>
+              <a:t>D</a:t>
+            </a:r>
+            <a:r>
               <a:rPr lang="nl-NL" sz="2000" dirty="0" smtClean="0"/>
-              <a:t>Draai alle unit testen </a:t>
+              <a:t>raai </a:t>
+            </a:r>
+            <a:r>
+              <a:rPr lang="nl-NL" sz="2000" dirty="0" smtClean="0"/>
+              <a:t>alle unit testen </a:t>
             </a:r>
             <a:r>
               <a:rPr lang="nl-NL" sz="2000" dirty="0">
@@ -7145,13 +7229,7 @@
               <a:rPr lang="nl-NL" sz="2800" dirty="0" err="1" smtClean="0">
                 <a:latin typeface="Bebas Neue" panose="020B0000000000000000" pitchFamily="34" charset="0"/>
               </a:rPr>
-              <a:t>developm</a:t>
-            </a:r>
-            <a:r>
-              <a:rPr lang="nl-NL" sz="2800" dirty="0" err="1" smtClean="0">
-                <a:latin typeface="Bebas Neue" panose="020B0000000000000000" pitchFamily="34" charset="0"/>
-              </a:rPr>
-              <a:t>ent</a:t>
+              <a:t>development</a:t>
             </a:r>
             <a:endParaRPr lang="nl-NL" dirty="0">
               <a:latin typeface="Bebas Neue" panose="020B0000000000000000" pitchFamily="34" charset="0"/>
@@ -7370,13 +7448,7 @@
               <a:rPr lang="nl-NL" sz="2800" dirty="0" err="1" smtClean="0">
                 <a:latin typeface="Bebas Neue" panose="020B0000000000000000" pitchFamily="34" charset="0"/>
               </a:rPr>
-              <a:t>developm</a:t>
-            </a:r>
-            <a:r>
-              <a:rPr lang="nl-NL" sz="2800" dirty="0" err="1" smtClean="0">
-                <a:latin typeface="Bebas Neue" panose="020B0000000000000000" pitchFamily="34" charset="0"/>
-              </a:rPr>
-              <a:t>ent</a:t>
+              <a:t>development</a:t>
             </a:r>
             <a:endParaRPr lang="nl-NL" dirty="0">
               <a:latin typeface="Bebas Neue" panose="020B0000000000000000" pitchFamily="34" charset="0"/>
@@ -7474,11 +7546,7 @@
             </a:r>
             <a:r>
               <a:rPr lang="nl-NL" sz="2400" dirty="0" err="1" smtClean="0"/>
-              <a:t>requiremen</a:t>
-            </a:r>
-            <a:r>
-              <a:rPr lang="nl-NL" sz="2400" dirty="0" err="1" smtClean="0"/>
-              <a:t>ts</a:t>
+              <a:t>requirements</a:t>
             </a:r>
             <a:endParaRPr lang="nl-NL" sz="2400" dirty="0" smtClean="0"/>
           </a:p>
@@ -7542,8 +7610,24 @@
             </a:r>
             <a:r>
               <a:rPr lang="nl-NL" sz="2400" dirty="0" smtClean="0"/>
-              <a:t> code</a:t>
-            </a:r>
+              <a:t> </a:t>
+            </a:r>
+            <a:r>
+              <a:rPr lang="nl-NL" sz="2400" dirty="0" smtClean="0"/>
+              <a:t>code</a:t>
+            </a:r>
+          </a:p>
+          <a:p>
+            <a:pPr>
+              <a:lnSpc>
+                <a:spcPct val="100000"/>
+              </a:lnSpc>
+            </a:pPr>
+            <a:r>
+              <a:rPr lang="nl-NL" sz="2400" dirty="0" smtClean="0"/>
+              <a:t>TDD helpt bij het oplossen van bugs</a:t>
+            </a:r>
+            <a:endParaRPr lang="nl-NL" sz="2400" dirty="0" smtClean="0"/>
           </a:p>
           <a:p>
             <a:pPr marL="0" indent="0">
@@ -7694,13 +7778,7 @@
               <a:rPr lang="nl-NL" sz="2800" dirty="0" err="1" smtClean="0">
                 <a:latin typeface="Bebas Neue" panose="020B0000000000000000" pitchFamily="34" charset="0"/>
               </a:rPr>
-              <a:t>developm</a:t>
-            </a:r>
-            <a:r>
-              <a:rPr lang="nl-NL" sz="2800" dirty="0" err="1" smtClean="0">
-                <a:latin typeface="Bebas Neue" panose="020B0000000000000000" pitchFamily="34" charset="0"/>
-              </a:rPr>
-              <a:t>ent</a:t>
+              <a:t>development</a:t>
             </a:r>
             <a:endParaRPr lang="nl-NL" dirty="0">
               <a:latin typeface="Bebas Neue" panose="020B0000000000000000" pitchFamily="34" charset="0"/>
@@ -7772,6 +7850,26 @@
               </a:lnSpc>
               <a:buNone/>
             </a:pPr>
+            <a:r>
+              <a:rPr lang="nl-NL" sz="2800" dirty="0" smtClean="0"/>
+              <a:t>YTD: </a:t>
+            </a:r>
+            <a:r>
+              <a:rPr lang="nl-NL" sz="2800" dirty="0" err="1" smtClean="0"/>
+              <a:t>tov</a:t>
+            </a:r>
+            <a:r>
+              <a:rPr lang="nl-NL" sz="2800" dirty="0" smtClean="0"/>
+              <a:t> code first / geen unit testen..</a:t>
+            </a:r>
+          </a:p>
+          <a:p>
+            <a:pPr marL="0" indent="0">
+              <a:lnSpc>
+                <a:spcPct val="100000"/>
+              </a:lnSpc>
+              <a:buNone/>
+            </a:pPr>
             <a:endParaRPr lang="nl-NL" sz="2800" dirty="0" smtClean="0"/>
           </a:p>
           <a:p>
@@ -7783,8 +7881,9 @@
             </a:pPr>
             <a:r>
               <a:rPr lang="nl-NL" sz="2800" dirty="0" smtClean="0"/>
-              <a:t>Nadelen</a:t>
-            </a:r>
+              <a:t>Nadelen </a:t>
+            </a:r>
+            <a:endParaRPr lang="nl-NL" sz="2800" dirty="0" smtClean="0"/>
           </a:p>
           <a:p>
             <a:pPr>
@@ -7816,8 +7915,13 @@
             </a:pPr>
             <a:r>
               <a:rPr lang="nl-NL" sz="2400" dirty="0"/>
-              <a:t>Meer code / tijd</a:t>
-            </a:r>
+              <a:t>Meer code / </a:t>
+            </a:r>
+            <a:r>
+              <a:rPr lang="nl-NL" sz="2400" dirty="0" smtClean="0"/>
+              <a:t>tijd t.o.v. geen unit testen</a:t>
+            </a:r>
+            <a:endParaRPr lang="nl-NL" sz="2400" dirty="0"/>
           </a:p>
           <a:p>
             <a:pPr>
@@ -7958,13 +8062,7 @@
               <a:rPr lang="nl-NL" sz="2800" dirty="0" err="1" smtClean="0">
                 <a:latin typeface="Bebas Neue" panose="020B0000000000000000" pitchFamily="34" charset="0"/>
               </a:rPr>
-              <a:t>developm</a:t>
-            </a:r>
-            <a:r>
-              <a:rPr lang="nl-NL" sz="2800" dirty="0" err="1" smtClean="0">
-                <a:latin typeface="Bebas Neue" panose="020B0000000000000000" pitchFamily="34" charset="0"/>
-              </a:rPr>
-              <a:t>ent</a:t>
+              <a:t>development</a:t>
             </a:r>
             <a:endParaRPr lang="nl-NL" dirty="0">
               <a:latin typeface="Bebas Neue" panose="020B0000000000000000" pitchFamily="34" charset="0"/>
@@ -8054,18 +8152,13 @@
               </a:lnSpc>
               <a:buNone/>
             </a:pPr>
-            <a:endParaRPr lang="nl-NL" sz="2800" dirty="0" smtClean="0"/>
-          </a:p>
-          <a:p>
-            <a:pPr marL="0" indent="0">
-              <a:lnSpc>
-                <a:spcPct val="100000"/>
-              </a:lnSpc>
-              <a:buNone/>
-            </a:pPr>
             <a:r>
               <a:rPr lang="nl-NL" sz="2800" dirty="0" smtClean="0"/>
-              <a:t>Mogelijke werkwijze met Pair Programming:</a:t>
+              <a:t>Mogelijke </a:t>
+            </a:r>
+            <a:r>
+              <a:rPr lang="nl-NL" sz="2800" dirty="0" smtClean="0"/>
+              <a:t>werkwijze met Pair Programming:</a:t>
             </a:r>
           </a:p>
           <a:p>
@@ -8107,34 +8200,18 @@
             </a:pPr>
             <a:r>
               <a:rPr lang="nl-NL" sz="2800" dirty="0"/>
-              <a:t>Persoon 2 schrijft </a:t>
-            </a:r>
+              <a:t>Persoon 2 schrijft een falende test</a:t>
+            </a:r>
+          </a:p>
+          <a:p>
+            <a:pPr>
+              <a:lnSpc>
+                <a:spcPct val="100000"/>
+              </a:lnSpc>
+            </a:pPr>
             <a:r>
               <a:rPr lang="nl-NL" sz="2800" dirty="0"/>
-              <a:t>een falende </a:t>
-            </a:r>
-            <a:r>
-              <a:rPr lang="nl-NL" sz="2800" dirty="0"/>
-              <a:t>test</a:t>
-            </a:r>
-          </a:p>
-          <a:p>
-            <a:pPr>
-              <a:lnSpc>
-                <a:spcPct val="100000"/>
-              </a:lnSpc>
-            </a:pPr>
-            <a:r>
-              <a:rPr lang="nl-NL" sz="2800" dirty="0"/>
-              <a:t>Persoon </a:t>
-            </a:r>
-            <a:r>
-              <a:rPr lang="nl-NL" sz="2800" dirty="0"/>
-              <a:t>1 </a:t>
-            </a:r>
-            <a:r>
-              <a:rPr lang="nl-NL" sz="2800" dirty="0"/>
-              <a:t>implementeert de code</a:t>
+              <a:t>Persoon 1 implementeert de code</a:t>
             </a:r>
           </a:p>
           <a:p>
@@ -8153,7 +8230,40 @@
               </a:lnSpc>
               <a:buNone/>
             </a:pPr>
-            <a:endParaRPr lang="nl-NL" sz="2400" dirty="0"/>
+            <a:r>
+              <a:rPr lang="nl-NL" sz="2400" dirty="0" smtClean="0"/>
+              <a:t>Of wissel per x minuten af…</a:t>
+            </a:r>
+          </a:p>
+          <a:p>
+            <a:pPr marL="0" indent="0">
+              <a:lnSpc>
+                <a:spcPct val="100000"/>
+              </a:lnSpc>
+              <a:buNone/>
+            </a:pPr>
+            <a:endParaRPr lang="nl-NL" sz="2400" dirty="0" smtClean="0"/>
+          </a:p>
+          <a:p>
+            <a:pPr marL="0" indent="0">
+              <a:lnSpc>
+                <a:spcPct val="100000"/>
+              </a:lnSpc>
+              <a:buNone/>
+            </a:pPr>
+            <a:r>
+              <a:rPr lang="nl-NL" sz="2400" dirty="0" smtClean="0"/>
+              <a:t>YTD: waarom pair </a:t>
+            </a:r>
+            <a:r>
+              <a:rPr lang="nl-NL" sz="2400" dirty="0" err="1" smtClean="0"/>
+              <a:t>programming</a:t>
+            </a:r>
+            <a:r>
+              <a:rPr lang="nl-NL" sz="2400" dirty="0" smtClean="0"/>
+              <a:t>? (voor/nadelen + ethiek)</a:t>
+            </a:r>
+            <a:endParaRPr lang="nl-NL" sz="2400" dirty="0" smtClean="0"/>
           </a:p>
           <a:p>
             <a:pPr>
@@ -8223,7 +8333,7 @@
         </p:nvSpPr>
         <p:spPr>
           <a:xfrm flipV="1">
-            <a:off x="6660232" y="2852936"/>
+            <a:off x="6660232" y="2276872"/>
             <a:ext cx="731520" cy="1800200"/>
           </a:xfrm>
           <a:prstGeom prst="curvedLeftArrow">
@@ -8544,13 +8654,8 @@
             </a:pPr>
             <a:r>
               <a:rPr lang="nl-NL" sz="2000" dirty="0" smtClean="0"/>
-              <a:t>Alleen positieve en gehele getallen worden </a:t>
-            </a:r>
-            <a:r>
-              <a:rPr lang="nl-NL" sz="2000" dirty="0"/>
-              <a:t>geconverteerd</a:t>
-            </a:r>
-            <a:endParaRPr lang="nl-NL" sz="2000" dirty="0" smtClean="0"/>
+              <a:t>Alleen positieve en gehele getallen worden geconverteerd</a:t>
+            </a:r>
           </a:p>
           <a:p>
             <a:pPr marL="0" indent="0">
@@ -8893,7 +8998,6 @@
               <a:rPr lang="nl-NL" sz="2000" dirty="0" smtClean="0"/>
               <a:t>geconverteerd, anders een melding dat dat niet kan</a:t>
             </a:r>
-            <a:endParaRPr lang="nl-NL" sz="2000" dirty="0" smtClean="0"/>
           </a:p>
           <a:p>
             <a:pPr marL="0" indent="0">

</xml_diff>